<commit_message>
couple of additions to slides
</commit_message>
<xml_diff>
--- a/Documents/PresentationWinter/Winter Presentation.pptx
+++ b/Documents/PresentationWinter/Winter Presentation.pptx
@@ -8434,11 +8434,11 @@
             <a:pPr lvl="3"/>
             <a:r>
               <a:rPr lang="en-US" dirty="0"/>
-              <a:t>Send the LED state to the proper controller </a:t>
+              <a:t>Send the LED state to the proper controller via </a:t>
             </a:r>
             <a:r>
               <a:rPr lang="en-US"/>
-              <a:t>via serial</a:t>
+              <a:t>UART serial</a:t>
             </a:r>
             <a:endParaRPr lang="en-US" dirty="0"/>
           </a:p>

</xml_diff>

<commit_message>
Added led controller panel and struggles.
</commit_message>
<xml_diff>
--- a/Documents/PresentationWinter/Winter Presentation.pptx
+++ b/Documents/PresentationWinter/Winter Presentation.pptx
@@ -8528,7 +8528,66 @@
           <a:bodyPr/>
           <a:lstStyle/>
           <a:p>
-            <a:endParaRPr lang="en-US"/>
+            <a:r>
+              <a:rPr lang="en-US" dirty="0"/>
+              <a:t>Objective: Send data from the state composer to the LED registers</a:t>
+            </a:r>
+          </a:p>
+          <a:p>
+            <a:pPr lvl="1"/>
+            <a:r>
+              <a:rPr lang="en-US" dirty="0"/>
+              <a:t>  Create LED color object</a:t>
+            </a:r>
+          </a:p>
+          <a:p>
+            <a:pPr lvl="1"/>
+            <a:r>
+              <a:rPr lang="en-US" dirty="0"/>
+              <a:t>Set RX and TX pin modes</a:t>
+            </a:r>
+          </a:p>
+          <a:p>
+            <a:pPr lvl="1"/>
+            <a:r>
+              <a:rPr lang="en-US" dirty="0"/>
+              <a:t>If Serial buffer is not empty</a:t>
+            </a:r>
+          </a:p>
+          <a:p>
+            <a:pPr lvl="2"/>
+            <a:r>
+              <a:rPr lang="en-US" dirty="0"/>
+              <a:t>Read LED index</a:t>
+            </a:r>
+          </a:p>
+          <a:p>
+            <a:pPr lvl="2"/>
+            <a:r>
+              <a:rPr lang="en-US" dirty="0"/>
+              <a:t>Read red value</a:t>
+            </a:r>
+          </a:p>
+          <a:p>
+            <a:pPr lvl="2"/>
+            <a:r>
+              <a:rPr lang="en-US" dirty="0"/>
+              <a:t>Read green value</a:t>
+            </a:r>
+          </a:p>
+          <a:p>
+            <a:pPr lvl="2"/>
+            <a:r>
+              <a:rPr lang="en-US" dirty="0"/>
+              <a:t>Read blue value</a:t>
+            </a:r>
+          </a:p>
+          <a:p>
+            <a:pPr lvl="2"/>
+            <a:r>
+              <a:rPr lang="en-US" dirty="0"/>
+              <a:t>Set RGB values for given LED index</a:t>
+            </a:r>
           </a:p>
         </p:txBody>
       </p:sp>
@@ -8616,7 +8675,23 @@
           <a:bodyPr/>
           <a:lstStyle/>
           <a:p>
-            <a:endParaRPr lang="en-US" dirty="0"/>
+            <a:r>
+              <a:rPr lang="en-US" dirty="0"/>
+              <a:t>Communication between the Arduino Nano and the Raspberry pi</a:t>
+            </a:r>
+          </a:p>
+          <a:p>
+            <a:pPr lvl="1"/>
+            <a:r>
+              <a:rPr lang="en-US" dirty="0"/>
+              <a:t>Needed to know type of input to the Nano</a:t>
+            </a:r>
+          </a:p>
+          <a:p>
+            <a:r>
+              <a:rPr lang="en-US" dirty="0"/>
+              <a:t>Serial read efficiency on Arduino Nano</a:t>
+            </a:r>
           </a:p>
         </p:txBody>
       </p:sp>

</xml_diff>

<commit_message>
Added api and state composer to powerpoint
</commit_message>
<xml_diff>
--- a/Documents/PresentationWinter/Winter Presentation.pptx
+++ b/Documents/PresentationWinter/Winter Presentation.pptx
@@ -124,6 +124,10 @@
 </p:presentation>
 </file>
 
+<file path=ppt/revisionInfo.xml><?xml version="1.0" encoding="utf-8"?>
+<p1510:revInfo xmlns:a="http://schemas.openxmlformats.org/drawingml/2006/main" xmlns:r="http://schemas.openxmlformats.org/officeDocument/2006/relationships" xmlns:p1510="http://schemas.microsoft.com/office/powerpoint/2015/10/main"/>
+</file>
+
 <file path=ppt/notesMasters/notesMaster1.xml><?xml version="1.0" encoding="utf-8"?>
 <p:notesMaster xmlns:a="http://schemas.openxmlformats.org/drawingml/2006/main" xmlns:r="http://schemas.openxmlformats.org/officeDocument/2006/relationships" xmlns:p="http://schemas.openxmlformats.org/presentationml/2006/main">
   <p:cSld>
@@ -455,6 +459,125 @@
     </a:lvl9pPr>
   </p:notesStyle>
 </p:notesMaster>
+</file>
+
+<file path=ppt/notesSlides/notesSlide1.xml><?xml version="1.0" encoding="utf-8"?>
+<p:notes xmlns:a="http://schemas.openxmlformats.org/drawingml/2006/main" xmlns:r="http://schemas.openxmlformats.org/officeDocument/2006/relationships" xmlns:p="http://schemas.openxmlformats.org/presentationml/2006/main">
+  <p:cSld>
+    <p:spTree>
+      <p:nvGrpSpPr>
+        <p:cNvPr id="1" name=""/>
+        <p:cNvGrpSpPr/>
+        <p:nvPr/>
+      </p:nvGrpSpPr>
+      <p:grpSpPr>
+        <a:xfrm>
+          <a:off x="0" y="0"/>
+          <a:ext cx="0" cy="0"/>
+          <a:chOff x="0" y="0"/>
+          <a:chExt cx="0" cy="0"/>
+        </a:xfrm>
+      </p:grpSpPr>
+      <p:sp>
+        <p:nvSpPr>
+          <p:cNvPr id="2" name="Slide Image Placeholder 1"/>
+          <p:cNvSpPr>
+            <a:spLocks noGrp="1" noRot="1" noChangeAspect="1"/>
+          </p:cNvSpPr>
+          <p:nvPr>
+            <p:ph type="sldImg"/>
+          </p:nvPr>
+        </p:nvSpPr>
+        <p:spPr>
+          <a:xfrm>
+            <a:off x="869950" y="1257300"/>
+            <a:ext cx="6032500" cy="3394075"/>
+          </a:xfrm>
+          <a:prstGeom prst="rect">
+            <a:avLst/>
+          </a:prstGeom>
+          <a:noFill/>
+          <a:ln w="12700">
+            <a:solidFill>
+              <a:prstClr val="black"/>
+            </a:solidFill>
+          </a:ln>
+        </p:spPr>
+      </p:sp>
+      <p:sp>
+        <p:nvSpPr>
+          <p:cNvPr id="3" name="Notes Placeholder 2"/>
+          <p:cNvSpPr>
+            <a:spLocks noGrp="1"/>
+          </p:cNvSpPr>
+          <p:nvPr>
+            <p:ph type="body" idx="1"/>
+          </p:nvPr>
+        </p:nvSpPr>
+        <p:spPr/>
+        <p:txBody>
+          <a:bodyPr/>
+          <a:lstStyle/>
+          <a:p>
+            <a:endParaRPr lang="en-US" dirty="0"/>
+          </a:p>
+        </p:txBody>
+      </p:sp>
+      <p:sp>
+        <p:nvSpPr>
+          <p:cNvPr id="4" name="Slide Number Placeholder 3"/>
+          <p:cNvSpPr>
+            <a:spLocks noGrp="1"/>
+          </p:cNvSpPr>
+          <p:nvPr>
+            <p:ph type="sldNum" idx="10"/>
+          </p:nvPr>
+        </p:nvSpPr>
+        <p:spPr/>
+        <p:txBody>
+          <a:bodyPr/>
+          <a:lstStyle/>
+          <a:p>
+            <a:pPr algn="r"/>
+            <a:fld id="{265BFA24-D9C6-42B5-9713-99EC8D16D2CB}" type="slidenum">
+              <a:rPr lang="en-US" sz="1400" b="0" strike="noStrike" spc="-1" smtClean="0">
+                <a:solidFill>
+                  <a:srgbClr val="000000"/>
+                </a:solidFill>
+                <a:uFill>
+                  <a:solidFill>
+                    <a:srgbClr val="FFFFFF"/>
+                  </a:solidFill>
+                </a:uFill>
+                <a:latin typeface="Times New Roman"/>
+              </a:rPr>
+              <a:t>6</a:t>
+            </a:fld>
+            <a:endParaRPr lang="en-US" sz="1400" b="0" strike="noStrike" spc="-1">
+              <a:solidFill>
+                <a:srgbClr val="000000"/>
+              </a:solidFill>
+              <a:uFill>
+                <a:solidFill>
+                  <a:srgbClr val="FFFFFF"/>
+                </a:solidFill>
+              </a:uFill>
+              <a:latin typeface="Times New Roman"/>
+            </a:endParaRPr>
+          </a:p>
+        </p:txBody>
+      </p:sp>
+    </p:spTree>
+    <p:extLst>
+      <p:ext uri="{BB962C8B-B14F-4D97-AF65-F5344CB8AC3E}">
+        <p14:creationId xmlns:p14="http://schemas.microsoft.com/office/powerpoint/2010/main" val="3582109871"/>
+      </p:ext>
+    </p:extLst>
+  </p:cSld>
+  <p:clrMapOvr>
+    <a:masterClrMapping/>
+  </p:clrMapOvr>
+</p:notes>
 </file>
 
 <file path=ppt/slideLayouts/slideLayout1.xml><?xml version="1.0" encoding="utf-8"?>
@@ -1180,7 +1303,7 @@
             <a:fld id="{B61BEF0D-F0BB-DE4B-95CE-6DB70DBA9567}" type="datetimeFigureOut">
               <a:rPr lang="en-US" dirty="0"/>
               <a:pPr/>
-              <a:t>2/15/2018</a:t>
+              <a:t>2/16/2018</a:t>
             </a:fld>
             <a:endParaRPr lang="en-US" dirty="0"/>
           </a:p>
@@ -1447,7 +1570,7 @@
                 </a:uFill>
                 <a:latin typeface="Trebuchet MS"/>
               </a:rPr>
-              <a:t>2/15/2018</a:t>
+              <a:t>2/16/2018</a:t>
             </a:fld>
             <a:endParaRPr lang="en-US" sz="900" b="0" strike="noStrike" spc="-1">
               <a:solidFill>
@@ -1821,7 +1944,7 @@
                 </a:uFill>
                 <a:latin typeface="Trebuchet MS"/>
               </a:rPr>
-              <a:t>2/15/2018</a:t>
+              <a:t>2/16/2018</a:t>
             </a:fld>
             <a:endParaRPr lang="en-US" sz="900" b="0" strike="noStrike" spc="-1">
               <a:solidFill>
@@ -2222,7 +2345,7 @@
                 </a:uFill>
                 <a:latin typeface="Trebuchet MS"/>
               </a:rPr>
-              <a:t>2/15/2018</a:t>
+              <a:t>2/16/2018</a:t>
             </a:fld>
             <a:endParaRPr lang="en-US" sz="900" b="0" strike="noStrike" spc="-1">
               <a:solidFill>
@@ -2596,7 +2719,7 @@
                 </a:uFill>
                 <a:latin typeface="Trebuchet MS"/>
               </a:rPr>
-              <a:t>2/15/2018</a:t>
+              <a:t>2/16/2018</a:t>
             </a:fld>
             <a:endParaRPr lang="en-US" sz="900" b="0" strike="noStrike" spc="-1">
               <a:solidFill>
@@ -3049,7 +3172,7 @@
                 </a:uFill>
                 <a:latin typeface="Trebuchet MS"/>
               </a:rPr>
-              <a:t>2/15/2018</a:t>
+              <a:t>2/16/2018</a:t>
             </a:fld>
             <a:endParaRPr lang="en-US" sz="900" b="0" strike="noStrike" spc="-1">
               <a:solidFill>
@@ -3279,7 +3402,7 @@
                 </a:uFill>
                 <a:latin typeface="Trebuchet MS"/>
               </a:rPr>
-              <a:t>2/15/2018</a:t>
+              <a:t>2/16/2018</a:t>
             </a:fld>
             <a:endParaRPr lang="en-US" sz="900" b="0" strike="noStrike" spc="-1">
               <a:solidFill>
@@ -3519,7 +3642,7 @@
                 </a:uFill>
                 <a:latin typeface="Trebuchet MS"/>
               </a:rPr>
-              <a:t>2/15/2018</a:t>
+              <a:t>2/16/2018</a:t>
             </a:fld>
             <a:endParaRPr lang="en-US" sz="900" b="0" strike="noStrike" spc="-1">
               <a:solidFill>
@@ -3755,7 +3878,7 @@
                 </a:uFill>
                 <a:latin typeface="Trebuchet MS"/>
               </a:rPr>
-              <a:t>2/15/2018</a:t>
+              <a:t>2/16/2018</a:t>
             </a:fld>
             <a:endParaRPr lang="en-US" sz="900" b="0" strike="noStrike" spc="-1">
               <a:solidFill>
@@ -4062,7 +4185,7 @@
                 </a:uFill>
                 <a:latin typeface="Trebuchet MS"/>
               </a:rPr>
-              <a:t>2/15/2018</a:t>
+              <a:t>2/16/2018</a:t>
             </a:fld>
             <a:endParaRPr lang="en-US" sz="900" b="0" strike="noStrike" spc="-1">
               <a:solidFill>
@@ -4354,7 +4477,7 @@
                 </a:uFill>
                 <a:latin typeface="Trebuchet MS"/>
               </a:rPr>
-              <a:t>2/15/2018</a:t>
+              <a:t>2/16/2018</a:t>
             </a:fld>
             <a:endParaRPr lang="en-US" sz="900" b="0" strike="noStrike" spc="-1">
               <a:solidFill>
@@ -4788,7 +4911,7 @@
                 </a:uFill>
                 <a:latin typeface="Trebuchet MS"/>
               </a:rPr>
-              <a:t>2/15/2018</a:t>
+              <a:t>2/16/2018</a:t>
             </a:fld>
             <a:endParaRPr lang="en-US" sz="900" b="0" strike="noStrike" spc="-1">
               <a:solidFill>
@@ -4957,7 +5080,7 @@
             <a:fld id="{B61BEF0D-F0BB-DE4B-95CE-6DB70DBA9567}" type="datetimeFigureOut">
               <a:rPr lang="en-US" dirty="0"/>
               <a:pPr/>
-              <a:t>2/15/2018</a:t>
+              <a:t>2/16/2018</a:t>
             </a:fld>
             <a:endParaRPr lang="en-US" dirty="0"/>
           </a:p>
@@ -5068,7 +5191,7 @@
                 </a:uFill>
                 <a:latin typeface="Trebuchet MS"/>
               </a:rPr>
-              <a:t>2/15/2018</a:t>
+              <a:t>2/16/2018</a:t>
             </a:fld>
             <a:endParaRPr lang="en-US" sz="900" b="0" strike="noStrike" spc="-1">
               <a:solidFill>
@@ -5383,7 +5506,7 @@
                 </a:uFill>
                 <a:latin typeface="Trebuchet MS"/>
               </a:rPr>
-              <a:t>2/15/2018</a:t>
+              <a:t>2/16/2018</a:t>
             </a:fld>
             <a:endParaRPr lang="en-US" sz="900" b="0" strike="noStrike" spc="-1">
               <a:solidFill>
@@ -5706,7 +5829,7 @@
                 </a:uFill>
                 <a:latin typeface="Trebuchet MS"/>
               </a:rPr>
-              <a:t>2/15/2018</a:t>
+              <a:t>2/16/2018</a:t>
             </a:fld>
             <a:endParaRPr lang="en-US" sz="900" b="0" strike="noStrike" spc="-1">
               <a:solidFill>
@@ -6509,7 +6632,7 @@
                 </a:uFill>
                 <a:latin typeface="Trebuchet MS"/>
               </a:rPr>
-              <a:t>2/15/2018</a:t>
+              <a:t>2/16/2018</a:t>
             </a:fld>
             <a:endParaRPr lang="en-US" sz="900" b="0" strike="noStrike" spc="-1">
               <a:solidFill>
@@ -8240,7 +8363,7 @@
           <a:p>
             <a:r>
               <a:rPr lang="en-US" dirty="0"/>
-              <a:t>Subsystems – Internal State</a:t>
+              <a:t>Subsystems – API and Internal State</a:t>
             </a:r>
           </a:p>
         </p:txBody>
@@ -8261,12 +8384,94 @@
             <p:ph idx="1"/>
           </p:nvPr>
         </p:nvSpPr>
-        <p:spPr/>
-        <p:txBody>
-          <a:bodyPr/>
+        <p:spPr>
+          <a:xfrm>
+            <a:off x="677334" y="1676401"/>
+            <a:ext cx="8596668" cy="4953000"/>
+          </a:xfrm>
+        </p:spPr>
+        <p:txBody>
+          <a:bodyPr>
+            <a:normAutofit/>
+          </a:bodyPr>
           <a:lstStyle/>
           <a:p>
-            <a:endParaRPr lang="en-US"/>
+            <a:r>
+              <a:rPr lang="en-US" dirty="0"/>
+              <a:t>Objectives:</a:t>
+            </a:r>
+          </a:p>
+          <a:p>
+            <a:pPr lvl="1"/>
+            <a:r>
+              <a:rPr lang="en-US" dirty="0"/>
+              <a:t>API: Provide entry point for data</a:t>
+            </a:r>
+          </a:p>
+          <a:p>
+            <a:pPr lvl="1"/>
+            <a:r>
+              <a:rPr lang="en-US" dirty="0"/>
+              <a:t>Internal State: represent system in memory</a:t>
+            </a:r>
+          </a:p>
+          <a:p>
+            <a:r>
+              <a:rPr lang="en-US" dirty="0"/>
+              <a:t>API</a:t>
+            </a:r>
+          </a:p>
+          <a:p>
+            <a:pPr lvl="1"/>
+            <a:r>
+              <a:rPr lang="en-US" dirty="0"/>
+              <a:t>RESTful http endpoint</a:t>
+            </a:r>
+          </a:p>
+          <a:p>
+            <a:pPr lvl="1"/>
+            <a:r>
+              <a:rPr lang="en-US" dirty="0"/>
+              <a:t>Routes mapped to actions</a:t>
+            </a:r>
+          </a:p>
+          <a:p>
+            <a:pPr lvl="1"/>
+            <a:r>
+              <a:rPr lang="en-US" dirty="0" err="1"/>
+              <a:t>Pistache</a:t>
+            </a:r>
+            <a:endParaRPr lang="en-US" dirty="0"/>
+          </a:p>
+          <a:p>
+            <a:r>
+              <a:rPr lang="en-US" dirty="0"/>
+              <a:t>Internal State</a:t>
+            </a:r>
+          </a:p>
+          <a:p>
+            <a:pPr lvl="1"/>
+            <a:r>
+              <a:rPr lang="en-US" dirty="0"/>
+              <a:t>Six objects</a:t>
+            </a:r>
+          </a:p>
+          <a:p>
+            <a:pPr lvl="1"/>
+            <a:r>
+              <a:rPr lang="en-US" dirty="0"/>
+              <a:t>Four representational</a:t>
+            </a:r>
+          </a:p>
+          <a:p>
+            <a:pPr lvl="1"/>
+            <a:r>
+              <a:rPr lang="en-US" dirty="0"/>
+              <a:t>Two relational</a:t>
+            </a:r>
+          </a:p>
+          <a:p>
+            <a:endParaRPr lang="en-US" dirty="0"/>
           </a:p>
         </p:txBody>
       </p:sp>
@@ -8434,13 +8639,8 @@
             <a:pPr lvl="3"/>
             <a:r>
               <a:rPr lang="en-US" dirty="0"/>
-              <a:t>Send the LED state to the proper controller via </a:t>
-            </a:r>
-            <a:r>
-              <a:rPr lang="en-US"/>
-              <a:t>UART serial</a:t>
-            </a:r>
-            <a:endParaRPr lang="en-US" dirty="0"/>
+              <a:t>Send the LED state to the proper controller via UART serial</a:t>
+            </a:r>
           </a:p>
         </p:txBody>
       </p:sp>

</xml_diff>

<commit_message>
added few extras on ppt
</commit_message>
<xml_diff>
--- a/Documents/PresentationWinter/Winter Presentation.pptx
+++ b/Documents/PresentationWinter/Winter Presentation.pptx
@@ -8556,27 +8556,51 @@
         </p:nvSpPr>
         <p:spPr>
           <a:xfrm>
-            <a:off x="677334" y="2160589"/>
-            <a:ext cx="8596668" cy="4193558"/>
+            <a:off x="677334" y="1684729"/>
+            <a:ext cx="8596668" cy="4930676"/>
           </a:xfrm>
         </p:spPr>
         <p:txBody>
-          <a:bodyPr/>
+          <a:bodyPr>
+            <a:normAutofit/>
+          </a:bodyPr>
           <a:lstStyle/>
           <a:p>
             <a:r>
               <a:rPr lang="en-US" dirty="0"/>
-              <a:t>Objective: Transpose the Internal State onto the hardware</a:t>
-            </a:r>
-            <a:br>
+              <a:t>Objectives: </a:t>
+            </a:r>
+          </a:p>
+          <a:p>
+            <a:pPr lvl="1"/>
+            <a:r>
               <a:rPr lang="en-US" dirty="0"/>
-            </a:br>
+              <a:t>Collect the Internal State’s currently running profile</a:t>
+            </a:r>
+          </a:p>
+          <a:p>
+            <a:pPr lvl="1"/>
+            <a:r>
+              <a:rPr lang="en-US" dirty="0"/>
+              <a:t>Gather all virtual LEDs and transpose onto the actual LEDs</a:t>
+            </a:r>
+          </a:p>
+          <a:p>
+            <a:r>
+              <a:rPr lang="en-US" dirty="0"/>
+              <a:t>Algorithm </a:t>
+            </a:r>
+            <a:r>
+              <a:rPr lang="en-US" dirty="0" err="1"/>
+              <a:t>Psuedocode</a:t>
+            </a:r>
             <a:endParaRPr lang="en-US" dirty="0"/>
           </a:p>
           <a:p>
+            <a:pPr lvl="1"/>
             <a:r>
               <a:rPr lang="en-US" dirty="0"/>
-              <a:t>Get the current profile from the state</a:t>
+              <a:t>Get the current active profile from the state</a:t>
             </a:r>
           </a:p>
           <a:p>
@@ -8639,7 +8663,7 @@
             <a:pPr lvl="3"/>
             <a:r>
               <a:rPr lang="en-US" dirty="0"/>
-              <a:t>Send the LED state to the proper controller via UART serial</a:t>
+              <a:t>Send the LED to the proper controller via UART serial</a:t>
             </a:r>
           </a:p>
         </p:txBody>
@@ -8737,7 +8761,7 @@
             <a:pPr lvl="1"/>
             <a:r>
               <a:rPr lang="en-US" dirty="0"/>
-              <a:t>  Create LED color object</a:t>
+              <a:t>Create LED color object</a:t>
             </a:r>
           </a:p>
           <a:p>
@@ -8884,13 +8908,35 @@
             <a:pPr lvl="1"/>
             <a:r>
               <a:rPr lang="en-US" dirty="0"/>
-              <a:t>Needed to know type of input to the Nano</a:t>
-            </a:r>
-          </a:p>
-          <a:p>
+              <a:t>Needed to know type of input to the Nano, output from Pi</a:t>
+            </a:r>
+          </a:p>
+          <a:p>
+            <a:pPr lvl="1"/>
             <a:r>
               <a:rPr lang="en-US" dirty="0"/>
-              <a:t>Serial read efficiency on Arduino Nano</a:t>
+              <a:t>Timing issues between State Composer and the Arduino</a:t>
+            </a:r>
+          </a:p>
+          <a:p>
+            <a:pPr lvl="2"/>
+            <a:r>
+              <a:rPr lang="en-US" dirty="0"/>
+              <a:t>RGB Colors sporadic</a:t>
+            </a:r>
+          </a:p>
+          <a:p>
+            <a:r>
+              <a:rPr lang="en-US" dirty="0"/>
+              <a:t>Serial </a:t>
+            </a:r>
+            <a:r>
+              <a:rPr lang="en-US"/>
+              <a:t>read efficiency </a:t>
+            </a:r>
+            <a:r>
+              <a:rPr lang="en-US" dirty="0"/>
+              <a:t>on Arduino Nano</a:t>
             </a:r>
           </a:p>
         </p:txBody>

</xml_diff>